<commit_message>
Session 2 - Editing the first slideshow, making the second slideshow
</commit_message>
<xml_diff>
--- a/VP Debate Intro Week 1.pptx
+++ b/VP Debate Intro Week 1.pptx
@@ -3094,7 +3094,48 @@
         </p:nvSpPr>
         <p:spPr>
           <a:xfrm rot="0">
-            <a:off x="379625" y="4017328"/>
+            <a:off x="379625" y="3698600"/>
+            <a:ext cx="2252662" cy="1049020"/>
+          </a:xfrm>
+          <a:prstGeom prst="rect">
+            <a:avLst/>
+          </a:prstGeom>
+        </p:spPr>
+        <p:txBody>
+          <a:bodyPr anchor="t" rtlCol="false" tIns="0" lIns="0" bIns="0" rIns="0">
+            <a:spAutoFit/>
+          </a:bodyPr>
+          <a:lstStyle/>
+          <a:p>
+            <a:pPr algn="l">
+              <a:lnSpc>
+                <a:spcPts val="7279"/>
+              </a:lnSpc>
+            </a:pPr>
+            <a:r>
+              <a:rPr lang="en-US" sz="5199">
+                <a:solidFill>
+                  <a:srgbClr val="7F2519"/>
+                </a:solidFill>
+                <a:latin typeface="Cooper Hewitt Bold"/>
+                <a:ea typeface="Cooper Hewitt Bold"/>
+                <a:cs typeface="Cooper Hewitt Bold"/>
+                <a:sym typeface="Cooper Hewitt Bold"/>
+              </a:rPr>
+              <a:t>Week 2</a:t>
+            </a:r>
+          </a:p>
+        </p:txBody>
+      </p:sp>
+      <p:sp>
+        <p:nvSpPr>
+          <p:cNvPr name="TextBox 3" id="3"/>
+          <p:cNvSpPr txBox="true"/>
+          <p:nvPr/>
+        </p:nvSpPr>
+        <p:spPr>
+          <a:xfrm rot="0">
+            <a:off x="379625" y="4507505"/>
             <a:ext cx="7661970" cy="1823719"/>
           </a:xfrm>
           <a:prstGeom prst="rect">
@@ -3123,6 +3164,47 @@
                 <a:sym typeface="Cooper Hewitt Bold"/>
               </a:rPr>
               <a:t>Debate Basics</a:t>
+            </a:r>
+          </a:p>
+        </p:txBody>
+      </p:sp>
+      <p:sp>
+        <p:nvSpPr>
+          <p:cNvPr name="TextBox 4" id="4"/>
+          <p:cNvSpPr txBox="true"/>
+          <p:nvPr/>
+        </p:nvSpPr>
+        <p:spPr>
+          <a:xfrm rot="0">
+            <a:off x="379625" y="3698600"/>
+            <a:ext cx="2252662" cy="1049020"/>
+          </a:xfrm>
+          <a:prstGeom prst="rect">
+            <a:avLst/>
+          </a:prstGeom>
+        </p:spPr>
+        <p:txBody>
+          <a:bodyPr anchor="t" rtlCol="false" tIns="0" lIns="0" bIns="0" rIns="0">
+            <a:spAutoFit/>
+          </a:bodyPr>
+          <a:lstStyle/>
+          <a:p>
+            <a:pPr algn="l">
+              <a:lnSpc>
+                <a:spcPts val="7279"/>
+              </a:lnSpc>
+            </a:pPr>
+            <a:r>
+              <a:rPr lang="en-US" sz="5199">
+                <a:solidFill>
+                  <a:srgbClr val="F6E7A7"/>
+                </a:solidFill>
+                <a:latin typeface="Cooper Hewitt Bold"/>
+                <a:ea typeface="Cooper Hewitt Bold"/>
+                <a:cs typeface="Cooper Hewitt Bold"/>
+                <a:sym typeface="Cooper Hewitt Bold"/>
+              </a:rPr>
+              <a:t>Week 1</a:t>
             </a:r>
           </a:p>
         </p:txBody>

</xml_diff>